<commit_message>
Add case statements to presentation
</commit_message>
<xml_diff>
--- a/Presentation1.pptx
+++ b/Presentation1.pptx
@@ -5,7 +5,7 @@
     <p:sldMasterId id="2147483648" r:id="rId1"/>
   </p:sldMasterIdLst>
   <p:notesMasterIdLst>
-    <p:notesMasterId r:id="rId14"/>
+    <p:notesMasterId r:id="rId15"/>
   </p:notesMasterIdLst>
   <p:sldIdLst>
     <p:sldId id="256" r:id="rId2"/>
@@ -18,8 +18,9 @@
     <p:sldId id="265" r:id="rId9"/>
     <p:sldId id="261" r:id="rId10"/>
     <p:sldId id="266" r:id="rId11"/>
-    <p:sldId id="268" r:id="rId12"/>
-    <p:sldId id="267" r:id="rId13"/>
+    <p:sldId id="269" r:id="rId12"/>
+    <p:sldId id="268" r:id="rId13"/>
+    <p:sldId id="267" r:id="rId14"/>
   </p:sldIdLst>
   <p:sldSz cx="12192000" cy="6858000"/>
   <p:notesSz cx="6858000" cy="9144000"/>
@@ -208,7 +209,7 @@
           <a:p>
             <a:fld id="{204FFBF9-32A0-D644-A257-3CFAF0B17EAC}" type="datetimeFigureOut">
               <a:rPr lang="en-US" smtClean="0"/>
-              <a:t>5/26/17</a:t>
+              <a:t>5/27/17</a:t>
             </a:fld>
             <a:endParaRPr lang="en-US"/>
           </a:p>
@@ -646,7 +647,7 @@
             <a:fld id="{87DE6118-2437-4B30-8E3C-4D2BE6020583}" type="datetimeFigureOut">
               <a:rPr lang="en-US" dirty="0"/>
               <a:pPr/>
-              <a:t>5/26/17</a:t>
+              <a:t>5/27/17</a:t>
             </a:fld>
             <a:endParaRPr lang="en-US" dirty="0"/>
           </a:p>
@@ -972,7 +973,7 @@
           <a:p>
             <a:fld id="{87DE6118-2437-4B30-8E3C-4D2BE6020583}" type="datetimeFigureOut">
               <a:rPr lang="en-US" dirty="0"/>
-              <a:t>5/26/17</a:t>
+              <a:t>5/27/17</a:t>
             </a:fld>
             <a:endParaRPr lang="en-US" dirty="0"/>
           </a:p>
@@ -1147,7 +1148,7 @@
           <a:p>
             <a:fld id="{87DE6118-2437-4B30-8E3C-4D2BE6020583}" type="datetimeFigureOut">
               <a:rPr lang="en-US" dirty="0"/>
-              <a:t>5/26/17</a:t>
+              <a:t>5/27/17</a:t>
             </a:fld>
             <a:endParaRPr lang="en-US" dirty="0"/>
           </a:p>
@@ -1312,7 +1313,7 @@
           <a:p>
             <a:fld id="{87DE6118-2437-4B30-8E3C-4D2BE6020583}" type="datetimeFigureOut">
               <a:rPr lang="en-US" dirty="0"/>
-              <a:t>5/26/17</a:t>
+              <a:t>5/27/17</a:t>
             </a:fld>
             <a:endParaRPr lang="en-US" dirty="0"/>
           </a:p>
@@ -1585,7 +1586,7 @@
             <a:fld id="{87DE6118-2437-4B30-8E3C-4D2BE6020583}" type="datetimeFigureOut">
               <a:rPr lang="en-US" dirty="0"/>
               <a:pPr/>
-              <a:t>5/26/17</a:t>
+              <a:t>5/27/17</a:t>
             </a:fld>
             <a:endParaRPr lang="en-US" dirty="0"/>
           </a:p>
@@ -1975,7 +1976,7 @@
           <a:p>
             <a:fld id="{87DE6118-2437-4B30-8E3C-4D2BE6020583}" type="datetimeFigureOut">
               <a:rPr lang="en-US" dirty="0"/>
-              <a:t>5/26/17</a:t>
+              <a:t>5/27/17</a:t>
             </a:fld>
             <a:endParaRPr lang="en-US" dirty="0"/>
           </a:p>
@@ -2447,7 +2448,7 @@
           <a:p>
             <a:fld id="{87DE6118-2437-4B30-8E3C-4D2BE6020583}" type="datetimeFigureOut">
               <a:rPr lang="en-US" dirty="0"/>
-              <a:t>5/26/17</a:t>
+              <a:t>5/27/17</a:t>
             </a:fld>
             <a:endParaRPr lang="en-US" dirty="0"/>
           </a:p>
@@ -2560,7 +2561,7 @@
           <a:p>
             <a:fld id="{87DE6118-2437-4B30-8E3C-4D2BE6020583}" type="datetimeFigureOut">
               <a:rPr lang="en-US" dirty="0"/>
-              <a:t>5/26/17</a:t>
+              <a:t>5/27/17</a:t>
             </a:fld>
             <a:endParaRPr lang="en-US" dirty="0"/>
           </a:p>
@@ -2650,7 +2651,7 @@
           <a:p>
             <a:fld id="{87DE6118-2437-4B30-8E3C-4D2BE6020583}" type="datetimeFigureOut">
               <a:rPr lang="en-US" dirty="0"/>
-              <a:t>5/26/17</a:t>
+              <a:t>5/27/17</a:t>
             </a:fld>
             <a:endParaRPr lang="en-US" dirty="0"/>
           </a:p>
@@ -2992,7 +2993,7 @@
             <a:fld id="{87DE6118-2437-4B30-8E3C-4D2BE6020583}" type="datetimeFigureOut">
               <a:rPr lang="en-US" dirty="0"/>
               <a:pPr/>
-              <a:t>5/26/17</a:t>
+              <a:t>5/27/17</a:t>
             </a:fld>
             <a:endParaRPr lang="en-US" dirty="0"/>
           </a:p>
@@ -3377,7 +3378,7 @@
             <a:fld id="{87DE6118-2437-4B30-8E3C-4D2BE6020583}" type="datetimeFigureOut">
               <a:rPr lang="en-US" dirty="0"/>
               <a:pPr/>
-              <a:t>5/26/17</a:t>
+              <a:t>5/27/17</a:t>
             </a:fld>
             <a:endParaRPr lang="en-US" dirty="0"/>
           </a:p>
@@ -3652,7 +3653,7 @@
             <a:fld id="{87DE6118-2437-4B30-8E3C-4D2BE6020583}" type="datetimeFigureOut">
               <a:rPr lang="en-US" dirty="0"/>
               <a:pPr/>
-              <a:t>5/26/17</a:t>
+              <a:t>5/27/17</a:t>
             </a:fld>
             <a:endParaRPr lang="en-US" dirty="0"/>
           </a:p>
@@ -4391,6 +4392,167 @@
         </p:nvSpPr>
         <p:spPr/>
         <p:txBody>
+          <a:bodyPr/>
+          <a:lstStyle/>
+          <a:p>
+            <a:r>
+              <a:rPr lang="en-US" dirty="0" smtClean="0"/>
+              <a:t>Examples: </a:t>
+            </a:r>
+            <a:br>
+              <a:rPr lang="en-US" dirty="0" smtClean="0"/>
+            </a:br>
+            <a:r>
+              <a:rPr lang="en-US" dirty="0"/>
+              <a:t> </a:t>
+            </a:r>
+            <a:r>
+              <a:rPr lang="en-US" dirty="0" smtClean="0"/>
+              <a:t>    </a:t>
+            </a:r>
+            <a:r>
+              <a:rPr lang="en-US" dirty="0" smtClean="0"/>
+              <a:t>password manager</a:t>
+            </a:r>
+            <a:endParaRPr lang="en-US" dirty="0"/>
+          </a:p>
+        </p:txBody>
+      </p:sp>
+      <p:pic>
+        <p:nvPicPr>
+          <p:cNvPr id="4" name="Picture 3"/>
+          <p:cNvPicPr>
+            <a:picLocks noChangeAspect="1"/>
+          </p:cNvPicPr>
+          <p:nvPr/>
+        </p:nvPicPr>
+        <p:blipFill>
+          <a:blip r:embed="rId2">
+            <a:extLst>
+              <a:ext uri="{28A0092B-C50C-407E-A947-70E740481C1C}">
+                <a14:useLocalDpi xmlns:a14="http://schemas.microsoft.com/office/drawing/2010/main" val="0"/>
+              </a:ext>
+            </a:extLst>
+          </a:blip>
+          <a:stretch>
+            <a:fillRect/>
+          </a:stretch>
+        </p:blipFill>
+        <p:spPr>
+          <a:xfrm>
+            <a:off x="6780213" y="266700"/>
+            <a:ext cx="4775200" cy="2019300"/>
+          </a:xfrm>
+          <a:prstGeom prst="rect">
+            <a:avLst/>
+          </a:prstGeom>
+        </p:spPr>
+      </p:pic>
+      <p:pic>
+        <p:nvPicPr>
+          <p:cNvPr id="3" name="Picture 2"/>
+          <p:cNvPicPr>
+            <a:picLocks noChangeAspect="1"/>
+          </p:cNvPicPr>
+          <p:nvPr/>
+        </p:nvPicPr>
+        <p:blipFill>
+          <a:blip r:embed="rId3"/>
+          <a:stretch>
+            <a:fillRect/>
+          </a:stretch>
+        </p:blipFill>
+        <p:spPr>
+          <a:xfrm>
+            <a:off x="1371600" y="3148012"/>
+            <a:ext cx="8636000" cy="2959100"/>
+          </a:xfrm>
+          <a:prstGeom prst="rect">
+            <a:avLst/>
+          </a:prstGeom>
+        </p:spPr>
+      </p:pic>
+      <p:sp>
+        <p:nvSpPr>
+          <p:cNvPr id="5" name="TextBox 4"/>
+          <p:cNvSpPr txBox="1"/>
+          <p:nvPr/>
+        </p:nvSpPr>
+        <p:spPr>
+          <a:xfrm>
+            <a:off x="1371600" y="2532340"/>
+            <a:ext cx="3348609" cy="369332"/>
+          </a:xfrm>
+          <a:prstGeom prst="rect">
+            <a:avLst/>
+          </a:prstGeom>
+          <a:noFill/>
+        </p:spPr>
+        <p:txBody>
+          <a:bodyPr wrap="none" rtlCol="0">
+            <a:spAutoFit/>
+          </a:bodyPr>
+          <a:lstStyle/>
+          <a:p>
+            <a:r>
+              <a:rPr lang="en-US" dirty="0">
+                <a:hlinkClick r:id="rId4"/>
+              </a:rPr>
+              <a:t>https://www.passwordstore.org/</a:t>
+            </a:r>
+            <a:endParaRPr lang="en-US" dirty="0"/>
+          </a:p>
+        </p:txBody>
+      </p:sp>
+    </p:spTree>
+    <p:extLst>
+      <p:ext uri="{BB962C8B-B14F-4D97-AF65-F5344CB8AC3E}">
+        <p14:creationId xmlns:p14="http://schemas.microsoft.com/office/powerpoint/2010/main" val="415109004"/>
+      </p:ext>
+    </p:extLst>
+  </p:cSld>
+  <p:clrMapOvr>
+    <a:masterClrMapping/>
+  </p:clrMapOvr>
+  <p:timing>
+    <p:tnLst>
+      <p:par>
+        <p:cTn id="1" dur="indefinite" restart="never" nodeType="tmRoot"/>
+      </p:par>
+    </p:tnLst>
+  </p:timing>
+</p:sld>
+</file>
+
+<file path=ppt/slides/slide12.xml><?xml version="1.0" encoding="utf-8"?>
+<p:sld xmlns:a="http://schemas.openxmlformats.org/drawingml/2006/main" xmlns:r="http://schemas.openxmlformats.org/officeDocument/2006/relationships" xmlns:p="http://schemas.openxmlformats.org/presentationml/2006/main">
+  <p:cSld>
+    <p:spTree>
+      <p:nvGrpSpPr>
+        <p:cNvPr id="1" name=""/>
+        <p:cNvGrpSpPr/>
+        <p:nvPr/>
+      </p:nvGrpSpPr>
+      <p:grpSpPr>
+        <a:xfrm>
+          <a:off x="0" y="0"/>
+          <a:ext cx="0" cy="0"/>
+          <a:chOff x="0" y="0"/>
+          <a:chExt cx="0" cy="0"/>
+        </a:xfrm>
+      </p:grpSpPr>
+      <p:sp>
+        <p:nvSpPr>
+          <p:cNvPr id="2" name="Title 1"/>
+          <p:cNvSpPr>
+            <a:spLocks noGrp="1"/>
+          </p:cNvSpPr>
+          <p:nvPr>
+            <p:ph type="title"/>
+          </p:nvPr>
+        </p:nvSpPr>
+        <p:spPr/>
+        <p:txBody>
           <a:bodyPr>
             <a:normAutofit/>
           </a:bodyPr>
@@ -4448,13 +4610,21 @@
           <a:p>
             <a:r>
               <a:rPr lang="en-US" dirty="0" smtClean="0"/>
-              <a:t>Obscure command + shell script = training wheels</a:t>
-            </a:r>
-          </a:p>
-          <a:p>
+              <a:t>Obscure command + shell script = training </a:t>
+            </a:r>
             <a:r>
               <a:rPr lang="en-US" dirty="0" smtClean="0"/>
-              <a:t>Loads more!</a:t>
+              <a:t>wheels</a:t>
+            </a:r>
+          </a:p>
+          <a:p>
+            <a:r>
+              <a:rPr lang="en-US" dirty="0" smtClean="0"/>
+              <a:t>Loads </a:t>
+            </a:r>
+            <a:r>
+              <a:rPr lang="en-US" dirty="0" smtClean="0"/>
+              <a:t>more!</a:t>
             </a:r>
           </a:p>
         </p:txBody>
@@ -4731,7 +4901,7 @@
 </p:sld>
 </file>
 
-<file path=ppt/slides/slide12.xml><?xml version="1.0" encoding="utf-8"?>
+<file path=ppt/slides/slide13.xml><?xml version="1.0" encoding="utf-8"?>
 <p:sld xmlns:a="http://schemas.openxmlformats.org/drawingml/2006/main" xmlns:r="http://schemas.openxmlformats.org/officeDocument/2006/relationships" xmlns:p="http://schemas.openxmlformats.org/presentationml/2006/main">
   <p:cSld>
     <p:spTree>
@@ -6144,7 +6314,7 @@
       </p:pic>
       <p:pic>
         <p:nvPicPr>
-          <p:cNvPr id="3" name="Picture 2"/>
+          <p:cNvPr id="5" name="Picture 4"/>
           <p:cNvPicPr>
             <a:picLocks noChangeAspect="1"/>
           </p:cNvPicPr>
@@ -6158,8 +6328,8 @@
         </p:blipFill>
         <p:spPr>
           <a:xfrm>
-            <a:off x="1112837" y="1841754"/>
-            <a:ext cx="5084763" cy="4641596"/>
+            <a:off x="1371600" y="1643062"/>
+            <a:ext cx="3727763" cy="4960937"/>
           </a:xfrm>
           <a:prstGeom prst="rect">
             <a:avLst/>

</xml_diff>